<commit_message>
Made changes to slides and added credits to authors
</commit_message>
<xml_diff>
--- a/Workshop_2/Session 2 - SQL Injections.pptx
+++ b/Workshop_2/Session 2 - SQL Injections.pptx
@@ -20,8 +20,8 @@
     <p:sldId id="263" r:id="rId11"/>
     <p:sldId id="264" r:id="rId12"/>
     <p:sldId id="265" r:id="rId13"/>
-    <p:sldId id="266" r:id="rId14"/>
-    <p:sldId id="267" r:id="rId15"/>
+    <p:sldId id="267" r:id="rId14"/>
+    <p:sldId id="270" r:id="rId15"/>
   </p:sldIdLst>
   <p:sldSz cx="9144000" cy="5143500" type="screen16x9"/>
   <p:notesSz cx="6858000" cy="9144000"/>
@@ -844,7 +844,7 @@
         </p:nvSpPr>
         <p:spPr>
           <a:xfrm>
-            <a:off x="381300" y="685800"/>
+            <a:off x="381000" y="685800"/>
             <a:ext cx="6096000" cy="3429000"/>
           </a:xfrm>
           <a:custGeom>
@@ -925,115 +925,6 @@
 </file>
 
 <file path=ppt/notesSlides/notesSlide11.xml><?xml version="1.0" encoding="utf-8"?>
-<p:notes xmlns:a="http://schemas.openxmlformats.org/drawingml/2006/main" xmlns:r="http://schemas.openxmlformats.org/officeDocument/2006/relationships" xmlns:p="http://schemas.openxmlformats.org/presentationml/2006/main" showMasterSp="0" showMasterPhAnim="0">
-  <p:cSld>
-    <p:spTree>
-      <p:nvGrpSpPr>
-        <p:cNvPr id="1" name="Shape 124"/>
-        <p:cNvGrpSpPr/>
-        <p:nvPr/>
-      </p:nvGrpSpPr>
-      <p:grpSpPr>
-        <a:xfrm>
-          <a:off x="0" y="0"/>
-          <a:ext cx="0" cy="0"/>
-          <a:chOff x="0" y="0"/>
-          <a:chExt cx="0" cy="0"/>
-        </a:xfrm>
-      </p:grpSpPr>
-      <p:sp>
-        <p:nvSpPr>
-          <p:cNvPr id="125" name="Shape 125"/>
-          <p:cNvSpPr>
-            <a:spLocks noGrp="1" noRot="1" noChangeAspect="1"/>
-          </p:cNvSpPr>
-          <p:nvPr>
-            <p:ph type="sldImg" idx="2"/>
-          </p:nvPr>
-        </p:nvSpPr>
-        <p:spPr>
-          <a:xfrm>
-            <a:off x="381300" y="685800"/>
-            <a:ext cx="6096000" cy="3429000"/>
-          </a:xfrm>
-          <a:custGeom>
-            <a:avLst/>
-            <a:gdLst/>
-            <a:ahLst/>
-            <a:cxnLst/>
-            <a:rect l="0" t="0" r="0" b="0"/>
-            <a:pathLst>
-              <a:path w="120000" h="120000" extrusionOk="0">
-                <a:moveTo>
-                  <a:pt x="0" y="0"/>
-                </a:moveTo>
-                <a:lnTo>
-                  <a:pt x="120000" y="0"/>
-                </a:lnTo>
-                <a:lnTo>
-                  <a:pt x="120000" y="120000"/>
-                </a:lnTo>
-                <a:lnTo>
-                  <a:pt x="0" y="120000"/>
-                </a:lnTo>
-                <a:close/>
-              </a:path>
-            </a:pathLst>
-          </a:custGeom>
-        </p:spPr>
-      </p:sp>
-      <p:sp>
-        <p:nvSpPr>
-          <p:cNvPr id="126" name="Shape 126"/>
-          <p:cNvSpPr txBox="1">
-            <a:spLocks noGrp="1"/>
-          </p:cNvSpPr>
-          <p:nvPr>
-            <p:ph type="body" idx="1"/>
-          </p:nvPr>
-        </p:nvSpPr>
-        <p:spPr>
-          <a:xfrm>
-            <a:off x="685800" y="4343400"/>
-            <a:ext cx="5486400" cy="4114800"/>
-          </a:xfrm>
-          <a:prstGeom prst="rect">
-            <a:avLst/>
-          </a:prstGeom>
-        </p:spPr>
-        <p:txBody>
-          <a:bodyPr spcFirstLastPara="1" wrap="square" lIns="91425" tIns="91425" rIns="91425" bIns="91425" anchor="t" anchorCtr="0">
-            <a:noAutofit/>
-          </a:bodyPr>
-          <a:lstStyle/>
-          <a:p>
-            <a:pPr marL="0" lvl="0" indent="0">
-              <a:spcBef>
-                <a:spcPts val="0"/>
-              </a:spcBef>
-              <a:spcAft>
-                <a:spcPts val="0"/>
-              </a:spcAft>
-              <a:buNone/>
-            </a:pPr>
-            <a:endParaRPr/>
-          </a:p>
-        </p:txBody>
-      </p:sp>
-    </p:spTree>
-    <p:extLst>
-      <p:ext uri="{BB962C8B-B14F-4D97-AF65-F5344CB8AC3E}">
-        <p14:creationId xmlns:p14="http://schemas.microsoft.com/office/powerpoint/2010/main" val="847351183"/>
-      </p:ext>
-    </p:extLst>
-  </p:cSld>
-  <p:clrMapOvr>
-    <a:masterClrMapping/>
-  </p:clrMapOvr>
-</p:notes>
-</file>
-
-<file path=ppt/notesSlides/notesSlide12.xml><?xml version="1.0" encoding="utf-8"?>
 <p:notes xmlns:a="http://schemas.openxmlformats.org/drawingml/2006/main" xmlns:r="http://schemas.openxmlformats.org/officeDocument/2006/relationships" xmlns:p="http://schemas.openxmlformats.org/presentationml/2006/main" showMasterSp="0" showMasterPhAnim="0">
   <p:cSld>
     <p:spTree>
@@ -1280,7 +1171,7 @@
         </p:nvSpPr>
         <p:spPr>
           <a:xfrm>
-            <a:off x="381300" y="685800"/>
+            <a:off x="381000" y="685800"/>
             <a:ext cx="6096000" cy="3429000"/>
           </a:xfrm>
           <a:custGeom>
@@ -1389,7 +1280,7 @@
         </p:nvSpPr>
         <p:spPr>
           <a:xfrm>
-            <a:off x="381300" y="685800"/>
+            <a:off x="381000" y="685800"/>
             <a:ext cx="6096000" cy="3429000"/>
           </a:xfrm>
           <a:custGeom>
@@ -8519,10 +8410,10 @@
               <a:buChar char="-"/>
             </a:pPr>
             <a:r>
-              <a:rPr lang="en"/>
+              <a:rPr lang="en" dirty="0"/>
               <a:t>You’re going to be asked to be quite creative for the rest of these questions. I will go over them if people get stuck.</a:t>
             </a:r>
-            <a:endParaRPr/>
+            <a:endParaRPr dirty="0"/>
           </a:p>
           <a:p>
             <a:pPr marL="457200" lvl="0" indent="-342900" rtl="0">
@@ -8536,78 +8427,18 @@
               <a:buChar char="-"/>
             </a:pPr>
             <a:r>
-              <a:rPr lang="en"/>
-              <a:t>Feel free to roam around WebGoat.</a:t>
+              <a:rPr lang="en" dirty="0"/>
+              <a:t>Feel free to roam around </a:t>
             </a:r>
-            <a:endParaRPr/>
-          </a:p>
-          <a:p>
-            <a:pPr marL="457200" lvl="0" indent="-342900" rtl="0">
-              <a:spcBef>
-                <a:spcPts val="0"/>
-              </a:spcBef>
-              <a:spcAft>
-                <a:spcPts val="0"/>
-              </a:spcAft>
-              <a:buSzPts val="1800"/>
-              <a:buChar char="-"/>
-            </a:pPr>
             <a:r>
-              <a:rPr lang="en"/>
-              <a:t>That first example is fairly simple. A common password verification technique is to do a SELECT on both username and password to see if they match and return anything, and give a valid session to that user if anything is returned.</a:t>
+              <a:rPr lang="en-US" dirty="0" err="1" smtClean="0"/>
+              <a:t>overthewire</a:t>
             </a:r>
-            <a:endParaRPr/>
-          </a:p>
-          <a:p>
-            <a:pPr marL="457200" lvl="0" indent="-342900" rtl="0">
-              <a:spcBef>
-                <a:spcPts val="0"/>
-              </a:spcBef>
-              <a:spcAft>
-                <a:spcPts val="0"/>
-              </a:spcAft>
-              <a:buSzPts val="1800"/>
-              <a:buChar char="-"/>
-            </a:pPr>
             <a:r>
-              <a:rPr lang="en"/>
-              <a:t>But think:</a:t>
+              <a:rPr lang="en" dirty="0" smtClean="0"/>
+              <a:t>.</a:t>
             </a:r>
-            <a:endParaRPr/>
-          </a:p>
-          <a:p>
-            <a:pPr marL="914400" lvl="1" indent="-317500" rtl="0">
-              <a:spcBef>
-                <a:spcPts val="0"/>
-              </a:spcBef>
-              <a:spcAft>
-                <a:spcPts val="0"/>
-              </a:spcAft>
-              <a:buSzPts val="1400"/>
-              <a:buChar char="-"/>
-            </a:pPr>
-            <a:r>
-              <a:rPr lang="en"/>
-              <a:t>Can you put SQL statements in injections? UNION ALL, for instance...</a:t>
-            </a:r>
-            <a:endParaRPr/>
-          </a:p>
-          <a:p>
-            <a:pPr marL="914400" lvl="1" indent="-317500">
-              <a:spcBef>
-                <a:spcPts val="0"/>
-              </a:spcBef>
-              <a:spcAft>
-                <a:spcPts val="0"/>
-              </a:spcAft>
-              <a:buSzPts val="1400"/>
-              <a:buChar char="-"/>
-            </a:pPr>
-            <a:r>
-              <a:rPr lang="en"/>
-              <a:t>What if you’re working blind…?</a:t>
-            </a:r>
-            <a:endParaRPr/>
+            <a:endParaRPr dirty="0"/>
           </a:p>
         </p:txBody>
       </p:sp>
@@ -8620,147 +8451,6 @@
 </file>
 
 <file path=ppt/slides/slide13.xml><?xml version="1.0" encoding="utf-8"?>
-<p:sld xmlns:a="http://schemas.openxmlformats.org/drawingml/2006/main" xmlns:r="http://schemas.openxmlformats.org/officeDocument/2006/relationships" xmlns:p="http://schemas.openxmlformats.org/presentationml/2006/main">
-  <p:cSld>
-    <p:spTree>
-      <p:nvGrpSpPr>
-        <p:cNvPr id="1" name="Shape 127"/>
-        <p:cNvGrpSpPr/>
-        <p:nvPr/>
-      </p:nvGrpSpPr>
-      <p:grpSpPr>
-        <a:xfrm>
-          <a:off x="0" y="0"/>
-          <a:ext cx="0" cy="0"/>
-          <a:chOff x="0" y="0"/>
-          <a:chExt cx="0" cy="0"/>
-        </a:xfrm>
-      </p:grpSpPr>
-      <p:sp>
-        <p:nvSpPr>
-          <p:cNvPr id="128" name="Shape 128"/>
-          <p:cNvSpPr txBox="1">
-            <a:spLocks noGrp="1"/>
-          </p:cNvSpPr>
-          <p:nvPr>
-            <p:ph type="title"/>
-          </p:nvPr>
-        </p:nvSpPr>
-        <p:spPr>
-          <a:xfrm>
-            <a:off x="471900" y="738725"/>
-            <a:ext cx="8222100" cy="767700"/>
-          </a:xfrm>
-          <a:prstGeom prst="rect">
-            <a:avLst/>
-          </a:prstGeom>
-        </p:spPr>
-        <p:txBody>
-          <a:bodyPr spcFirstLastPara="1" wrap="square" lIns="91425" tIns="91425" rIns="91425" bIns="91425" anchor="b" anchorCtr="0">
-            <a:noAutofit/>
-          </a:bodyPr>
-          <a:lstStyle/>
-          <a:p>
-            <a:pPr marL="0" lvl="0" indent="0">
-              <a:spcBef>
-                <a:spcPts val="0"/>
-              </a:spcBef>
-              <a:spcAft>
-                <a:spcPts val="0"/>
-              </a:spcAft>
-              <a:buNone/>
-            </a:pPr>
-            <a:r>
-              <a:rPr lang="en"/>
-              <a:t>SQLMap</a:t>
-            </a:r>
-            <a:endParaRPr/>
-          </a:p>
-        </p:txBody>
-      </p:sp>
-      <p:sp>
-        <p:nvSpPr>
-          <p:cNvPr id="129" name="Shape 129"/>
-          <p:cNvSpPr txBox="1">
-            <a:spLocks noGrp="1"/>
-          </p:cNvSpPr>
-          <p:nvPr>
-            <p:ph type="body" idx="1"/>
-          </p:nvPr>
-        </p:nvSpPr>
-        <p:spPr>
-          <a:xfrm>
-            <a:off x="471900" y="1919075"/>
-            <a:ext cx="8222100" cy="2710200"/>
-          </a:xfrm>
-          <a:prstGeom prst="rect">
-            <a:avLst/>
-          </a:prstGeom>
-        </p:spPr>
-        <p:txBody>
-          <a:bodyPr spcFirstLastPara="1" wrap="square" lIns="91425" tIns="91425" rIns="91425" bIns="91425" anchor="t" anchorCtr="0">
-            <a:noAutofit/>
-          </a:bodyPr>
-          <a:lstStyle/>
-          <a:p>
-            <a:pPr marL="0" lvl="0" indent="0">
-              <a:spcBef>
-                <a:spcPts val="0"/>
-              </a:spcBef>
-              <a:spcAft>
-                <a:spcPts val="0"/>
-              </a:spcAft>
-              <a:buNone/>
-            </a:pPr>
-            <a:r>
-              <a:rPr lang="en"/>
-              <a:t>The tool known as SQLmap is a less manual way of attacking databases. It is simply a Python script and can be installed with a package manager.</a:t>
-            </a:r>
-            <a:endParaRPr/>
-          </a:p>
-          <a:p>
-            <a:pPr marL="0" lvl="0" indent="0">
-              <a:spcBef>
-                <a:spcPts val="1600"/>
-              </a:spcBef>
-              <a:spcAft>
-                <a:spcPts val="0"/>
-              </a:spcAft>
-              <a:buNone/>
-            </a:pPr>
-            <a:r>
-              <a:rPr lang="en"/>
-              <a:t>If you use Windows, you’re on your own, but you can just use Homebrew on macOS or apt-get on Debian-based Linux distros to install sqlmap.</a:t>
-            </a:r>
-            <a:endParaRPr/>
-          </a:p>
-          <a:p>
-            <a:pPr marL="0" lvl="0" indent="0">
-              <a:spcBef>
-                <a:spcPts val="1600"/>
-              </a:spcBef>
-              <a:spcAft>
-                <a:spcPts val="1600"/>
-              </a:spcAft>
-              <a:buNone/>
-            </a:pPr>
-            <a:r>
-              <a:rPr lang="en"/>
-              <a:t>I will demonstrate how we might use SQLmap to attack a relational database.</a:t>
-            </a:r>
-            <a:endParaRPr/>
-          </a:p>
-        </p:txBody>
-      </p:sp>
-    </p:spTree>
-  </p:cSld>
-  <p:clrMapOvr>
-    <a:masterClrMapping/>
-  </p:clrMapOvr>
-</p:sld>
-</file>
-
-<file path=ppt/slides/slide14.xml><?xml version="1.0" encoding="utf-8"?>
 <p:sld xmlns:a="http://schemas.openxmlformats.org/drawingml/2006/main" xmlns:r="http://schemas.openxmlformats.org/officeDocument/2006/relationships" xmlns:p="http://schemas.openxmlformats.org/presentationml/2006/main">
   <p:cSld>
     <p:spTree>
@@ -8914,6 +8604,105 @@
         </p:txBody>
       </p:sp>
     </p:spTree>
+  </p:cSld>
+  <p:clrMapOvr>
+    <a:masterClrMapping/>
+  </p:clrMapOvr>
+</p:sld>
+</file>
+
+<file path=ppt/slides/slide14.xml><?xml version="1.0" encoding="utf-8"?>
+<p:sld xmlns:a="http://schemas.openxmlformats.org/drawingml/2006/main" xmlns:r="http://schemas.openxmlformats.org/officeDocument/2006/relationships" xmlns:p="http://schemas.openxmlformats.org/presentationml/2006/main">
+  <p:cSld>
+    <p:spTree>
+      <p:nvGrpSpPr>
+        <p:cNvPr id="1" name=""/>
+        <p:cNvGrpSpPr/>
+        <p:nvPr/>
+      </p:nvGrpSpPr>
+      <p:grpSpPr>
+        <a:xfrm>
+          <a:off x="0" y="0"/>
+          <a:ext cx="0" cy="0"/>
+          <a:chOff x="0" y="0"/>
+          <a:chExt cx="0" cy="0"/>
+        </a:xfrm>
+      </p:grpSpPr>
+      <p:sp>
+        <p:nvSpPr>
+          <p:cNvPr id="2" name="Title 1"/>
+          <p:cNvSpPr>
+            <a:spLocks noGrp="1"/>
+          </p:cNvSpPr>
+          <p:nvPr>
+            <p:ph type="title"/>
+          </p:nvPr>
+        </p:nvSpPr>
+        <p:spPr/>
+        <p:txBody>
+          <a:bodyPr/>
+          <a:lstStyle/>
+          <a:p>
+            <a:r>
+              <a:rPr lang="en-US" dirty="0" smtClean="0"/>
+              <a:t>Credits</a:t>
+            </a:r>
+            <a:endParaRPr lang="en-US" dirty="0"/>
+          </a:p>
+        </p:txBody>
+      </p:sp>
+      <p:sp>
+        <p:nvSpPr>
+          <p:cNvPr id="3" name="Text Placeholder 2"/>
+          <p:cNvSpPr>
+            <a:spLocks noGrp="1"/>
+          </p:cNvSpPr>
+          <p:nvPr>
+            <p:ph type="body" idx="1"/>
+          </p:nvPr>
+        </p:nvSpPr>
+        <p:spPr/>
+        <p:txBody>
+          <a:bodyPr/>
+          <a:lstStyle/>
+          <a:p>
+            <a:r>
+              <a:rPr lang="en-US" dirty="0" smtClean="0"/>
+              <a:t>Originally made by Thomas Wang </a:t>
+            </a:r>
+          </a:p>
+          <a:p>
+            <a:r>
+              <a:rPr lang="en-US" dirty="0" smtClean="0"/>
+              <a:t>Updated by </a:t>
+            </a:r>
+            <a:r>
+              <a:rPr lang="en-US" dirty="0" err="1" smtClean="0"/>
+              <a:t>Tarnvir</a:t>
+            </a:r>
+            <a:r>
+              <a:rPr lang="en-US" smtClean="0"/>
+              <a:t> Grewal </a:t>
+            </a:r>
+          </a:p>
+          <a:p>
+            <a:pPr marL="596900" lvl="1" indent="0">
+              <a:buNone/>
+            </a:pPr>
+            <a:r>
+              <a:rPr lang="en-US" dirty="0" smtClean="0"/>
+              <a:t> </a:t>
+            </a:r>
+            <a:endParaRPr lang="en-US" dirty="0"/>
+          </a:p>
+        </p:txBody>
+      </p:sp>
+    </p:spTree>
+    <p:extLst>
+      <p:ext uri="{BB962C8B-B14F-4D97-AF65-F5344CB8AC3E}">
+        <p14:creationId xmlns:p14="http://schemas.microsoft.com/office/powerpoint/2010/main" val="1738834928"/>
+      </p:ext>
+    </p:extLst>
   </p:cSld>
   <p:clrMapOvr>
     <a:masterClrMapping/>
@@ -9316,111 +9105,11 @@
             </a:pPr>
             <a:r>
               <a:rPr lang="en" dirty="0"/>
-              <a:t>We will run through these slides for only 15 minutes. The rest of the time will be working through the problems found in </a:t>
+              <a:t>We will run through these slides for only 15 minutes. The rest of the time will be working through the </a:t>
             </a:r>
             <a:r>
-              <a:rPr lang="en" dirty="0" err="1"/>
-              <a:t>WebGoat</a:t>
-            </a:r>
-            <a:r>
-              <a:rPr lang="en" dirty="0"/>
-              <a:t>.</a:t>
-            </a:r>
-            <a:endParaRPr dirty="0"/>
-          </a:p>
-          <a:p>
-            <a:pPr marL="0" lvl="0" indent="0">
-              <a:spcBef>
-                <a:spcPts val="1600"/>
-              </a:spcBef>
-              <a:spcAft>
-                <a:spcPts val="0"/>
-              </a:spcAft>
-              <a:buNone/>
-            </a:pPr>
-            <a:r>
-              <a:rPr lang="en" dirty="0"/>
-              <a:t>We strongly suggest using </a:t>
-            </a:r>
-            <a:r>
-              <a:rPr lang="en" dirty="0" err="1"/>
-              <a:t>Docker</a:t>
-            </a:r>
-            <a:r>
-              <a:rPr lang="en" dirty="0"/>
-              <a:t> to install </a:t>
-            </a:r>
-            <a:r>
-              <a:rPr lang="en" dirty="0" err="1"/>
-              <a:t>WebGoat</a:t>
-            </a:r>
-            <a:r>
-              <a:rPr lang="en" dirty="0"/>
-              <a:t>:</a:t>
-            </a:r>
-            <a:endParaRPr dirty="0"/>
-          </a:p>
-          <a:p>
-            <a:pPr marL="457200" lvl="0" indent="-342900" rtl="0">
-              <a:spcBef>
-                <a:spcPts val="1600"/>
-              </a:spcBef>
-              <a:spcAft>
-                <a:spcPts val="0"/>
-              </a:spcAft>
-              <a:buSzPts val="1800"/>
-              <a:buChar char="-"/>
-            </a:pPr>
-            <a:r>
-              <a:rPr lang="en" dirty="0" err="1"/>
-              <a:t>docker</a:t>
-            </a:r>
-            <a:r>
-              <a:rPr lang="en" dirty="0"/>
-              <a:t> pull </a:t>
-            </a:r>
-            <a:r>
-              <a:rPr lang="en" dirty="0" err="1"/>
-              <a:t>webgoat</a:t>
-            </a:r>
-            <a:r>
-              <a:rPr lang="en" dirty="0"/>
-              <a:t>/webgoat-7.1</a:t>
-            </a:r>
-            <a:br>
-              <a:rPr lang="en" dirty="0"/>
-            </a:br>
-            <a:r>
-              <a:rPr lang="en" dirty="0" err="1"/>
-              <a:t>docker</a:t>
-            </a:r>
-            <a:r>
-              <a:rPr lang="en" dirty="0"/>
-              <a:t> run -p 8080:8080 </a:t>
-            </a:r>
-            <a:r>
-              <a:rPr lang="en" dirty="0" err="1"/>
-              <a:t>webgoat</a:t>
-            </a:r>
-            <a:r>
-              <a:rPr lang="en" dirty="0"/>
-              <a:t>/webgoat-7.1</a:t>
-            </a:r>
-            <a:endParaRPr dirty="0"/>
-          </a:p>
-          <a:p>
-            <a:pPr marL="0" lvl="0" indent="0" rtl="0">
-              <a:spcBef>
-                <a:spcPts val="1600"/>
-              </a:spcBef>
-              <a:spcAft>
-                <a:spcPts val="0"/>
-              </a:spcAft>
-              <a:buNone/>
-            </a:pPr>
-            <a:r>
-              <a:rPr lang="en" dirty="0"/>
-              <a:t>Otherwise Google it and install it.</a:t>
+              <a:rPr lang="en-US" dirty="0" smtClean="0"/>
+              <a:t>workshop guide </a:t>
             </a:r>
             <a:endParaRPr dirty="0"/>
           </a:p>
@@ -9548,10 +9237,10 @@
               <a:buChar char="-"/>
             </a:pPr>
             <a:r>
-              <a:rPr lang="en"/>
+              <a:rPr lang="en" dirty="0"/>
               <a:t>Structured Query Language.</a:t>
             </a:r>
-            <a:endParaRPr/>
+            <a:endParaRPr dirty="0"/>
           </a:p>
           <a:p>
             <a:pPr marL="457200" lvl="0" indent="-342900" rtl="0">
@@ -9565,10 +9254,25 @@
               <a:buChar char="-"/>
             </a:pPr>
             <a:r>
-              <a:rPr lang="en"/>
-              <a:t>You will learn it in Database Systems if you haven’t already.</a:t>
+              <a:rPr lang="en-US" dirty="0"/>
+              <a:t>I</a:t>
             </a:r>
-            <a:endParaRPr/>
+            <a:r>
+              <a:rPr lang="en" dirty="0" smtClean="0"/>
+              <a:t>t </a:t>
+            </a:r>
+            <a:r>
+              <a:rPr lang="en-US" dirty="0" smtClean="0"/>
+              <a:t>is taught slightly </a:t>
+            </a:r>
+            <a:r>
+              <a:rPr lang="en" dirty="0" smtClean="0"/>
+              <a:t>in Database Systems</a:t>
+            </a:r>
+            <a:r>
+              <a:rPr lang="en-US" dirty="0" smtClean="0"/>
+              <a:t>. However their focus is to make you tech support. </a:t>
+            </a:r>
           </a:p>
           <a:p>
             <a:pPr marL="457200" lvl="0" indent="-342900" rtl="0">
@@ -9582,10 +9286,34 @@
               <a:buChar char="-"/>
             </a:pPr>
             <a:r>
-              <a:rPr lang="en"/>
-              <a:t>SQL is the language of (relational) databases. We can use it to get information and do stuff with data.</a:t>
+              <a:rPr lang="en" dirty="0" smtClean="0"/>
+              <a:t>SQL </a:t>
             </a:r>
-            <a:endParaRPr/>
+            <a:r>
+              <a:rPr lang="en" dirty="0"/>
+              <a:t>is the language of (relational) databases. We can use it to get information and </a:t>
+            </a:r>
+            <a:r>
+              <a:rPr lang="en-US" dirty="0" smtClean="0"/>
+              <a:t>can do various useful things </a:t>
+            </a:r>
+            <a:r>
+              <a:rPr lang="en" dirty="0" smtClean="0"/>
+              <a:t>with</a:t>
+            </a:r>
+            <a:r>
+              <a:rPr lang="en-US" dirty="0" smtClean="0"/>
+              <a:t> the</a:t>
+            </a:r>
+            <a:r>
+              <a:rPr lang="en" dirty="0" smtClean="0"/>
+              <a:t> </a:t>
+            </a:r>
+            <a:r>
+              <a:rPr lang="en" dirty="0"/>
+              <a:t>data.</a:t>
+            </a:r>
+            <a:endParaRPr dirty="0"/>
           </a:p>
           <a:p>
             <a:pPr marL="0" lvl="0" indent="0" rtl="0">
@@ -9598,10 +9326,10 @@
               <a:buNone/>
             </a:pPr>
             <a:r>
-              <a:rPr lang="en"/>
+              <a:rPr lang="en" dirty="0"/>
               <a:t>SQL looks like this:</a:t>
             </a:r>
-            <a:endParaRPr/>
+            <a:endParaRPr dirty="0"/>
           </a:p>
           <a:p>
             <a:pPr marL="0" lvl="0" indent="0" algn="ctr" rtl="0">
@@ -9614,15 +9342,33 @@
               <a:buNone/>
             </a:pPr>
             <a:r>
-              <a:rPr lang="en">
+              <a:rPr lang="en" dirty="0">
                 <a:latin typeface="Courier New"/>
                 <a:ea typeface="Courier New"/>
                 <a:cs typeface="Courier New"/>
                 <a:sym typeface="Courier New"/>
               </a:rPr>
-              <a:t>SELECT * FROM `Users` WHERE `uname` = “foo”;</a:t>
+              <a:t>SELECT * FROM `Users` WHERE `</a:t>
             </a:r>
-            <a:endParaRPr>
+            <a:r>
+              <a:rPr lang="en" dirty="0" err="1">
+                <a:latin typeface="Courier New"/>
+                <a:ea typeface="Courier New"/>
+                <a:cs typeface="Courier New"/>
+                <a:sym typeface="Courier New"/>
+              </a:rPr>
+              <a:t>uname</a:t>
+            </a:r>
+            <a:r>
+              <a:rPr lang="en" dirty="0">
+                <a:latin typeface="Courier New"/>
+                <a:ea typeface="Courier New"/>
+                <a:cs typeface="Courier New"/>
+                <a:sym typeface="Courier New"/>
+              </a:rPr>
+              <a:t>` = “foo”;</a:t>
+            </a:r>
+            <a:endParaRPr dirty="0">
               <a:latin typeface="Courier New"/>
               <a:ea typeface="Courier New"/>
               <a:cs typeface="Courier New"/>

</xml_diff>

<commit_message>
Updating slides and adding SQL cheatsheet
</commit_message>
<xml_diff>
--- a/Workshop_2/Session 2 - SQL Injections.pptx
+++ b/Workshop_2/Session 2 - SQL Injections.pptx
@@ -5,7 +5,7 @@
     <p:sldMasterId id="2147483659" r:id="rId1"/>
   </p:sldMasterIdLst>
   <p:notesMasterIdLst>
-    <p:notesMasterId r:id="rId16"/>
+    <p:notesMasterId r:id="rId19"/>
   </p:notesMasterIdLst>
   <p:sldIdLst>
     <p:sldId id="256" r:id="rId2"/>
@@ -17,11 +17,14 @@
     <p:sldId id="260" r:id="rId8"/>
     <p:sldId id="261" r:id="rId9"/>
     <p:sldId id="262" r:id="rId10"/>
-    <p:sldId id="263" r:id="rId11"/>
-    <p:sldId id="264" r:id="rId12"/>
-    <p:sldId id="265" r:id="rId13"/>
-    <p:sldId id="267" r:id="rId14"/>
-    <p:sldId id="270" r:id="rId15"/>
+    <p:sldId id="264" r:id="rId11"/>
+    <p:sldId id="272" r:id="rId12"/>
+    <p:sldId id="273" r:id="rId13"/>
+    <p:sldId id="274" r:id="rId14"/>
+    <p:sldId id="275" r:id="rId15"/>
+    <p:sldId id="267" r:id="rId16"/>
+    <p:sldId id="270" r:id="rId17"/>
+    <p:sldId id="271" r:id="rId18"/>
   </p:sldIdLst>
   <p:sldSz cx="9144000" cy="5143500" type="screen16x9"/>
   <p:notesSz cx="6858000" cy="9144000"/>
@@ -815,224 +818,6 @@
 </p:notes>
 </file>
 
-<file path=ppt/notesSlides/notesSlide10.xml><?xml version="1.0" encoding="utf-8"?>
-<p:notes xmlns:a="http://schemas.openxmlformats.org/drawingml/2006/main" xmlns:r="http://schemas.openxmlformats.org/officeDocument/2006/relationships" xmlns:p="http://schemas.openxmlformats.org/presentationml/2006/main" showMasterSp="0" showMasterPhAnim="0">
-  <p:cSld>
-    <p:spTree>
-      <p:nvGrpSpPr>
-        <p:cNvPr id="1" name="Shape 118"/>
-        <p:cNvGrpSpPr/>
-        <p:nvPr/>
-      </p:nvGrpSpPr>
-      <p:grpSpPr>
-        <a:xfrm>
-          <a:off x="0" y="0"/>
-          <a:ext cx="0" cy="0"/>
-          <a:chOff x="0" y="0"/>
-          <a:chExt cx="0" cy="0"/>
-        </a:xfrm>
-      </p:grpSpPr>
-      <p:sp>
-        <p:nvSpPr>
-          <p:cNvPr id="119" name="Shape 119"/>
-          <p:cNvSpPr>
-            <a:spLocks noGrp="1" noRot="1" noChangeAspect="1"/>
-          </p:cNvSpPr>
-          <p:nvPr>
-            <p:ph type="sldImg" idx="2"/>
-          </p:nvPr>
-        </p:nvSpPr>
-        <p:spPr>
-          <a:xfrm>
-            <a:off x="381000" y="685800"/>
-            <a:ext cx="6096000" cy="3429000"/>
-          </a:xfrm>
-          <a:custGeom>
-            <a:avLst/>
-            <a:gdLst/>
-            <a:ahLst/>
-            <a:cxnLst/>
-            <a:rect l="0" t="0" r="0" b="0"/>
-            <a:pathLst>
-              <a:path w="120000" h="120000" extrusionOk="0">
-                <a:moveTo>
-                  <a:pt x="0" y="0"/>
-                </a:moveTo>
-                <a:lnTo>
-                  <a:pt x="120000" y="0"/>
-                </a:lnTo>
-                <a:lnTo>
-                  <a:pt x="120000" y="120000"/>
-                </a:lnTo>
-                <a:lnTo>
-                  <a:pt x="0" y="120000"/>
-                </a:lnTo>
-                <a:close/>
-              </a:path>
-            </a:pathLst>
-          </a:custGeom>
-        </p:spPr>
-      </p:sp>
-      <p:sp>
-        <p:nvSpPr>
-          <p:cNvPr id="120" name="Shape 120"/>
-          <p:cNvSpPr txBox="1">
-            <a:spLocks noGrp="1"/>
-          </p:cNvSpPr>
-          <p:nvPr>
-            <p:ph type="body" idx="1"/>
-          </p:nvPr>
-        </p:nvSpPr>
-        <p:spPr>
-          <a:xfrm>
-            <a:off x="685800" y="4343400"/>
-            <a:ext cx="5486400" cy="4114800"/>
-          </a:xfrm>
-          <a:prstGeom prst="rect">
-            <a:avLst/>
-          </a:prstGeom>
-        </p:spPr>
-        <p:txBody>
-          <a:bodyPr spcFirstLastPara="1" wrap="square" lIns="91425" tIns="91425" rIns="91425" bIns="91425" anchor="t" anchorCtr="0">
-            <a:noAutofit/>
-          </a:bodyPr>
-          <a:lstStyle/>
-          <a:p>
-            <a:pPr marL="0" lvl="0" indent="0">
-              <a:spcBef>
-                <a:spcPts val="0"/>
-              </a:spcBef>
-              <a:spcAft>
-                <a:spcPts val="0"/>
-              </a:spcAft>
-              <a:buNone/>
-            </a:pPr>
-            <a:endParaRPr/>
-          </a:p>
-        </p:txBody>
-      </p:sp>
-    </p:spTree>
-    <p:extLst>
-      <p:ext uri="{BB962C8B-B14F-4D97-AF65-F5344CB8AC3E}">
-        <p14:creationId xmlns:p14="http://schemas.microsoft.com/office/powerpoint/2010/main" val="530436840"/>
-      </p:ext>
-    </p:extLst>
-  </p:cSld>
-  <p:clrMapOvr>
-    <a:masterClrMapping/>
-  </p:clrMapOvr>
-</p:notes>
-</file>
-
-<file path=ppt/notesSlides/notesSlide11.xml><?xml version="1.0" encoding="utf-8"?>
-<p:notes xmlns:a="http://schemas.openxmlformats.org/drawingml/2006/main" xmlns:r="http://schemas.openxmlformats.org/officeDocument/2006/relationships" xmlns:p="http://schemas.openxmlformats.org/presentationml/2006/main" showMasterSp="0" showMasterPhAnim="0">
-  <p:cSld>
-    <p:spTree>
-      <p:nvGrpSpPr>
-        <p:cNvPr id="1" name="Shape 130"/>
-        <p:cNvGrpSpPr/>
-        <p:nvPr/>
-      </p:nvGrpSpPr>
-      <p:grpSpPr>
-        <a:xfrm>
-          <a:off x="0" y="0"/>
-          <a:ext cx="0" cy="0"/>
-          <a:chOff x="0" y="0"/>
-          <a:chExt cx="0" cy="0"/>
-        </a:xfrm>
-      </p:grpSpPr>
-      <p:sp>
-        <p:nvSpPr>
-          <p:cNvPr id="131" name="Shape 131"/>
-          <p:cNvSpPr>
-            <a:spLocks noGrp="1" noRot="1" noChangeAspect="1"/>
-          </p:cNvSpPr>
-          <p:nvPr>
-            <p:ph type="sldImg" idx="2"/>
-          </p:nvPr>
-        </p:nvSpPr>
-        <p:spPr>
-          <a:xfrm>
-            <a:off x="381300" y="685800"/>
-            <a:ext cx="6096000" cy="3429000"/>
-          </a:xfrm>
-          <a:custGeom>
-            <a:avLst/>
-            <a:gdLst/>
-            <a:ahLst/>
-            <a:cxnLst/>
-            <a:rect l="0" t="0" r="0" b="0"/>
-            <a:pathLst>
-              <a:path w="120000" h="120000" extrusionOk="0">
-                <a:moveTo>
-                  <a:pt x="0" y="0"/>
-                </a:moveTo>
-                <a:lnTo>
-                  <a:pt x="120000" y="0"/>
-                </a:lnTo>
-                <a:lnTo>
-                  <a:pt x="120000" y="120000"/>
-                </a:lnTo>
-                <a:lnTo>
-                  <a:pt x="0" y="120000"/>
-                </a:lnTo>
-                <a:close/>
-              </a:path>
-            </a:pathLst>
-          </a:custGeom>
-        </p:spPr>
-      </p:sp>
-      <p:sp>
-        <p:nvSpPr>
-          <p:cNvPr id="132" name="Shape 132"/>
-          <p:cNvSpPr txBox="1">
-            <a:spLocks noGrp="1"/>
-          </p:cNvSpPr>
-          <p:nvPr>
-            <p:ph type="body" idx="1"/>
-          </p:nvPr>
-        </p:nvSpPr>
-        <p:spPr>
-          <a:xfrm>
-            <a:off x="685800" y="4343400"/>
-            <a:ext cx="5486400" cy="4114800"/>
-          </a:xfrm>
-          <a:prstGeom prst="rect">
-            <a:avLst/>
-          </a:prstGeom>
-        </p:spPr>
-        <p:txBody>
-          <a:bodyPr spcFirstLastPara="1" wrap="square" lIns="91425" tIns="91425" rIns="91425" bIns="91425" anchor="t" anchorCtr="0">
-            <a:noAutofit/>
-          </a:bodyPr>
-          <a:lstStyle/>
-          <a:p>
-            <a:pPr marL="0" lvl="0" indent="0">
-              <a:spcBef>
-                <a:spcPts val="0"/>
-              </a:spcBef>
-              <a:spcAft>
-                <a:spcPts val="0"/>
-              </a:spcAft>
-              <a:buNone/>
-            </a:pPr>
-            <a:endParaRPr/>
-          </a:p>
-        </p:txBody>
-      </p:sp>
-    </p:spTree>
-    <p:extLst>
-      <p:ext uri="{BB962C8B-B14F-4D97-AF65-F5344CB8AC3E}">
-        <p14:creationId xmlns:p14="http://schemas.microsoft.com/office/powerpoint/2010/main" val="1467269424"/>
-      </p:ext>
-    </p:extLst>
-  </p:cSld>
-  <p:clrMapOvr>
-    <a:masterClrMapping/>
-  </p:clrMapOvr>
-</p:notes>
-</file>
-
 <file path=ppt/notesSlides/notesSlide2.xml><?xml version="1.0" encoding="utf-8"?>
 <p:notes xmlns:a="http://schemas.openxmlformats.org/drawingml/2006/main" xmlns:r="http://schemas.openxmlformats.org/officeDocument/2006/relationships" xmlns:p="http://schemas.openxmlformats.org/presentationml/2006/main" showMasterSp="0" showMasterPhAnim="0">
   <p:cSld>
@@ -1692,115 +1477,6 @@
   <p:cSld>
     <p:spTree>
       <p:nvGrpSpPr>
-        <p:cNvPr id="1" name="Shape 106"/>
-        <p:cNvGrpSpPr/>
-        <p:nvPr/>
-      </p:nvGrpSpPr>
-      <p:grpSpPr>
-        <a:xfrm>
-          <a:off x="0" y="0"/>
-          <a:ext cx="0" cy="0"/>
-          <a:chOff x="0" y="0"/>
-          <a:chExt cx="0" cy="0"/>
-        </a:xfrm>
-      </p:grpSpPr>
-      <p:sp>
-        <p:nvSpPr>
-          <p:cNvPr id="107" name="Shape 107"/>
-          <p:cNvSpPr>
-            <a:spLocks noGrp="1" noRot="1" noChangeAspect="1"/>
-          </p:cNvSpPr>
-          <p:nvPr>
-            <p:ph type="sldImg" idx="2"/>
-          </p:nvPr>
-        </p:nvSpPr>
-        <p:spPr>
-          <a:xfrm>
-            <a:off x="381300" y="685800"/>
-            <a:ext cx="6096000" cy="3429000"/>
-          </a:xfrm>
-          <a:custGeom>
-            <a:avLst/>
-            <a:gdLst/>
-            <a:ahLst/>
-            <a:cxnLst/>
-            <a:rect l="0" t="0" r="0" b="0"/>
-            <a:pathLst>
-              <a:path w="120000" h="120000" extrusionOk="0">
-                <a:moveTo>
-                  <a:pt x="0" y="0"/>
-                </a:moveTo>
-                <a:lnTo>
-                  <a:pt x="120000" y="0"/>
-                </a:lnTo>
-                <a:lnTo>
-                  <a:pt x="120000" y="120000"/>
-                </a:lnTo>
-                <a:lnTo>
-                  <a:pt x="0" y="120000"/>
-                </a:lnTo>
-                <a:close/>
-              </a:path>
-            </a:pathLst>
-          </a:custGeom>
-        </p:spPr>
-      </p:sp>
-      <p:sp>
-        <p:nvSpPr>
-          <p:cNvPr id="108" name="Shape 108"/>
-          <p:cNvSpPr txBox="1">
-            <a:spLocks noGrp="1"/>
-          </p:cNvSpPr>
-          <p:nvPr>
-            <p:ph type="body" idx="1"/>
-          </p:nvPr>
-        </p:nvSpPr>
-        <p:spPr>
-          <a:xfrm>
-            <a:off x="685800" y="4343400"/>
-            <a:ext cx="5486400" cy="4114800"/>
-          </a:xfrm>
-          <a:prstGeom prst="rect">
-            <a:avLst/>
-          </a:prstGeom>
-        </p:spPr>
-        <p:txBody>
-          <a:bodyPr spcFirstLastPara="1" wrap="square" lIns="91425" tIns="91425" rIns="91425" bIns="91425" anchor="t" anchorCtr="0">
-            <a:noAutofit/>
-          </a:bodyPr>
-          <a:lstStyle/>
-          <a:p>
-            <a:pPr marL="0" lvl="0" indent="0">
-              <a:spcBef>
-                <a:spcPts val="0"/>
-              </a:spcBef>
-              <a:spcAft>
-                <a:spcPts val="0"/>
-              </a:spcAft>
-              <a:buNone/>
-            </a:pPr>
-            <a:endParaRPr/>
-          </a:p>
-        </p:txBody>
-      </p:sp>
-    </p:spTree>
-    <p:extLst>
-      <p:ext uri="{BB962C8B-B14F-4D97-AF65-F5344CB8AC3E}">
-        <p14:creationId xmlns:p14="http://schemas.microsoft.com/office/powerpoint/2010/main" val="1293956775"/>
-      </p:ext>
-    </p:extLst>
-  </p:cSld>
-  <p:clrMapOvr>
-    <a:masterClrMapping/>
-  </p:clrMapOvr>
-</p:notes>
-</file>
-
-<file path=ppt/notesSlides/notesSlide9.xml><?xml version="1.0" encoding="utf-8"?>
-<p:notes xmlns:a="http://schemas.openxmlformats.org/drawingml/2006/main" xmlns:r="http://schemas.openxmlformats.org/officeDocument/2006/relationships" xmlns:p="http://schemas.openxmlformats.org/presentationml/2006/main" showMasterSp="0" showMasterPhAnim="0">
-  <p:cSld>
-    <p:spTree>
-      <p:nvGrpSpPr>
         <p:cNvPr id="1" name="Shape 112"/>
         <p:cNvGrpSpPr/>
         <p:nvPr/>
@@ -1896,6 +1572,115 @@
     <p:extLst>
       <p:ext uri="{BB962C8B-B14F-4D97-AF65-F5344CB8AC3E}">
         <p14:creationId xmlns:p14="http://schemas.microsoft.com/office/powerpoint/2010/main" val="2112107903"/>
+      </p:ext>
+    </p:extLst>
+  </p:cSld>
+  <p:clrMapOvr>
+    <a:masterClrMapping/>
+  </p:clrMapOvr>
+</p:notes>
+</file>
+
+<file path=ppt/notesSlides/notesSlide9.xml><?xml version="1.0" encoding="utf-8"?>
+<p:notes xmlns:a="http://schemas.openxmlformats.org/drawingml/2006/main" xmlns:r="http://schemas.openxmlformats.org/officeDocument/2006/relationships" xmlns:p="http://schemas.openxmlformats.org/presentationml/2006/main" showMasterSp="0" showMasterPhAnim="0">
+  <p:cSld>
+    <p:spTree>
+      <p:nvGrpSpPr>
+        <p:cNvPr id="1" name="Shape 130"/>
+        <p:cNvGrpSpPr/>
+        <p:nvPr/>
+      </p:nvGrpSpPr>
+      <p:grpSpPr>
+        <a:xfrm>
+          <a:off x="0" y="0"/>
+          <a:ext cx="0" cy="0"/>
+          <a:chOff x="0" y="0"/>
+          <a:chExt cx="0" cy="0"/>
+        </a:xfrm>
+      </p:grpSpPr>
+      <p:sp>
+        <p:nvSpPr>
+          <p:cNvPr id="131" name="Shape 131"/>
+          <p:cNvSpPr>
+            <a:spLocks noGrp="1" noRot="1" noChangeAspect="1"/>
+          </p:cNvSpPr>
+          <p:nvPr>
+            <p:ph type="sldImg" idx="2"/>
+          </p:nvPr>
+        </p:nvSpPr>
+        <p:spPr>
+          <a:xfrm>
+            <a:off x="381000" y="685800"/>
+            <a:ext cx="6096000" cy="3429000"/>
+          </a:xfrm>
+          <a:custGeom>
+            <a:avLst/>
+            <a:gdLst/>
+            <a:ahLst/>
+            <a:cxnLst/>
+            <a:rect l="0" t="0" r="0" b="0"/>
+            <a:pathLst>
+              <a:path w="120000" h="120000" extrusionOk="0">
+                <a:moveTo>
+                  <a:pt x="0" y="0"/>
+                </a:moveTo>
+                <a:lnTo>
+                  <a:pt x="120000" y="0"/>
+                </a:lnTo>
+                <a:lnTo>
+                  <a:pt x="120000" y="120000"/>
+                </a:lnTo>
+                <a:lnTo>
+                  <a:pt x="0" y="120000"/>
+                </a:lnTo>
+                <a:close/>
+              </a:path>
+            </a:pathLst>
+          </a:custGeom>
+        </p:spPr>
+      </p:sp>
+      <p:sp>
+        <p:nvSpPr>
+          <p:cNvPr id="132" name="Shape 132"/>
+          <p:cNvSpPr txBox="1">
+            <a:spLocks noGrp="1"/>
+          </p:cNvSpPr>
+          <p:nvPr>
+            <p:ph type="body" idx="1"/>
+          </p:nvPr>
+        </p:nvSpPr>
+        <p:spPr>
+          <a:xfrm>
+            <a:off x="685800" y="4343400"/>
+            <a:ext cx="5486400" cy="4114800"/>
+          </a:xfrm>
+          <a:prstGeom prst="rect">
+            <a:avLst/>
+          </a:prstGeom>
+        </p:spPr>
+        <p:txBody>
+          <a:bodyPr spcFirstLastPara="1" wrap="square" lIns="91425" tIns="91425" rIns="91425" bIns="91425" anchor="t" anchorCtr="0">
+            <a:noAutofit/>
+          </a:bodyPr>
+          <a:lstStyle/>
+          <a:p>
+            <a:pPr marL="0" lvl="0" indent="0">
+              <a:spcBef>
+                <a:spcPts val="0"/>
+              </a:spcBef>
+              <a:spcAft>
+                <a:spcPts val="0"/>
+              </a:spcAft>
+              <a:buNone/>
+            </a:pPr>
+            <a:endParaRPr/>
+          </a:p>
+        </p:txBody>
+      </p:sp>
+    </p:spTree>
+    <p:extLst>
+      <p:ext uri="{BB962C8B-B14F-4D97-AF65-F5344CB8AC3E}">
+        <p14:creationId xmlns:p14="http://schemas.microsoft.com/office/powerpoint/2010/main" val="1467269424"/>
       </p:ext>
     </p:extLst>
   </p:cSld>
@@ -7949,194 +7734,6 @@
   <p:cSld>
     <p:spTree>
       <p:nvGrpSpPr>
-        <p:cNvPr id="1" name="Shape 109"/>
-        <p:cNvGrpSpPr/>
-        <p:nvPr/>
-      </p:nvGrpSpPr>
-      <p:grpSpPr>
-        <a:xfrm>
-          <a:off x="0" y="0"/>
-          <a:ext cx="0" cy="0"/>
-          <a:chOff x="0" y="0"/>
-          <a:chExt cx="0" cy="0"/>
-        </a:xfrm>
-      </p:grpSpPr>
-      <p:sp>
-        <p:nvSpPr>
-          <p:cNvPr id="110" name="Shape 110"/>
-          <p:cNvSpPr txBox="1">
-            <a:spLocks noGrp="1"/>
-          </p:cNvSpPr>
-          <p:nvPr>
-            <p:ph type="title"/>
-          </p:nvPr>
-        </p:nvSpPr>
-        <p:spPr>
-          <a:xfrm>
-            <a:off x="471900" y="738725"/>
-            <a:ext cx="8222100" cy="767700"/>
-          </a:xfrm>
-          <a:prstGeom prst="rect">
-            <a:avLst/>
-          </a:prstGeom>
-        </p:spPr>
-        <p:txBody>
-          <a:bodyPr spcFirstLastPara="1" wrap="square" lIns="91425" tIns="91425" rIns="91425" bIns="91425" anchor="b" anchorCtr="0">
-            <a:noAutofit/>
-          </a:bodyPr>
-          <a:lstStyle/>
-          <a:p>
-            <a:pPr marL="0" lvl="0" indent="0">
-              <a:spcBef>
-                <a:spcPts val="0"/>
-              </a:spcBef>
-              <a:spcAft>
-                <a:spcPts val="0"/>
-              </a:spcAft>
-              <a:buNone/>
-            </a:pPr>
-            <a:r>
-              <a:rPr lang="en"/>
-              <a:t>SQL Injections</a:t>
-            </a:r>
-            <a:endParaRPr/>
-          </a:p>
-        </p:txBody>
-      </p:sp>
-      <p:sp>
-        <p:nvSpPr>
-          <p:cNvPr id="111" name="Shape 111"/>
-          <p:cNvSpPr txBox="1">
-            <a:spLocks noGrp="1"/>
-          </p:cNvSpPr>
-          <p:nvPr>
-            <p:ph type="body" idx="1"/>
-          </p:nvPr>
-        </p:nvSpPr>
-        <p:spPr>
-          <a:xfrm>
-            <a:off x="471900" y="1919075"/>
-            <a:ext cx="8222100" cy="2710200"/>
-          </a:xfrm>
-          <a:prstGeom prst="rect">
-            <a:avLst/>
-          </a:prstGeom>
-        </p:spPr>
-        <p:txBody>
-          <a:bodyPr spcFirstLastPara="1" wrap="square" lIns="91425" tIns="91425" rIns="91425" bIns="91425" anchor="t" anchorCtr="0">
-            <a:noAutofit/>
-          </a:bodyPr>
-          <a:lstStyle/>
-          <a:p>
-            <a:pPr marL="0" lvl="0" indent="0" algn="ctr" rtl="0">
-              <a:spcBef>
-                <a:spcPts val="0"/>
-              </a:spcBef>
-              <a:spcAft>
-                <a:spcPts val="0"/>
-              </a:spcAft>
-              <a:buNone/>
-            </a:pPr>
-            <a:r>
-              <a:rPr lang="en">
-                <a:latin typeface="Courier New"/>
-                <a:ea typeface="Courier New"/>
-                <a:cs typeface="Courier New"/>
-                <a:sym typeface="Courier New"/>
-              </a:rPr>
-              <a:t>SELECT `email` FROM `Users` WHERE `uname` = ‘</a:t>
-            </a:r>
-            <a:r>
-              <a:rPr lang="en" b="1">
-                <a:latin typeface="Courier New"/>
-                <a:ea typeface="Courier New"/>
-                <a:cs typeface="Courier New"/>
-                <a:sym typeface="Courier New"/>
-              </a:rPr>
-              <a:t>?</a:t>
-            </a:r>
-            <a:r>
-              <a:rPr lang="en">
-                <a:latin typeface="Courier New"/>
-                <a:ea typeface="Courier New"/>
-                <a:cs typeface="Courier New"/>
-                <a:sym typeface="Courier New"/>
-              </a:rPr>
-              <a:t>’;</a:t>
-            </a:r>
-            <a:endParaRPr>
-              <a:latin typeface="Courier New"/>
-              <a:ea typeface="Courier New"/>
-              <a:cs typeface="Courier New"/>
-              <a:sym typeface="Courier New"/>
-            </a:endParaRPr>
-          </a:p>
-          <a:p>
-            <a:pPr marL="457200" lvl="0" indent="-342900" rtl="0">
-              <a:spcBef>
-                <a:spcPts val="1600"/>
-              </a:spcBef>
-              <a:spcAft>
-                <a:spcPts val="0"/>
-              </a:spcAft>
-              <a:buSzPts val="1800"/>
-              <a:buChar char="-"/>
-            </a:pPr>
-            <a:r>
-              <a:rPr lang="en"/>
-              <a:t>In this example, we allow the user to do an email search with a simple HTML form asking for a known username.</a:t>
-            </a:r>
-            <a:endParaRPr/>
-          </a:p>
-          <a:p>
-            <a:pPr marL="457200" lvl="0" indent="-342900" rtl="0">
-              <a:spcBef>
-                <a:spcPts val="0"/>
-              </a:spcBef>
-              <a:spcAft>
-                <a:spcPts val="0"/>
-              </a:spcAft>
-              <a:buSzPts val="1800"/>
-              <a:buChar char="-"/>
-            </a:pPr>
-            <a:r>
-              <a:rPr lang="en"/>
-              <a:t>The app then replaces the ? with your input.</a:t>
-            </a:r>
-            <a:endParaRPr/>
-          </a:p>
-          <a:p>
-            <a:pPr marL="457200" lvl="0" indent="-342900" rtl="0">
-              <a:spcBef>
-                <a:spcPts val="0"/>
-              </a:spcBef>
-              <a:spcAft>
-                <a:spcPts val="0"/>
-              </a:spcAft>
-              <a:buSzPts val="1800"/>
-              <a:buChar char="-"/>
-            </a:pPr>
-            <a:r>
-              <a:rPr lang="en"/>
-              <a:t>The PHP web app will normally show a table either with nothing in it, or one row showing the email of the user you queried.</a:t>
-            </a:r>
-            <a:endParaRPr/>
-          </a:p>
-        </p:txBody>
-      </p:sp>
-    </p:spTree>
-  </p:cSld>
-  <p:clrMapOvr>
-    <a:masterClrMapping/>
-  </p:clrMapOvr>
-</p:sld>
-</file>
-
-<file path=ppt/slides/slide11.xml><?xml version="1.0" encoding="utf-8"?>
-<p:sld xmlns:a="http://schemas.openxmlformats.org/drawingml/2006/main" xmlns:r="http://schemas.openxmlformats.org/officeDocument/2006/relationships" xmlns:p="http://schemas.openxmlformats.org/presentationml/2006/main">
-  <p:cSld>
-    <p:spTree>
-      <p:nvGrpSpPr>
         <p:cNvPr id="1" name="Shape 115"/>
         <p:cNvGrpSpPr/>
         <p:nvPr/>
@@ -8226,10 +7823,10 @@
               <a:buNone/>
             </a:pPr>
             <a:r>
-              <a:rPr lang="en"/>
+              <a:rPr lang="en" dirty="0"/>
               <a:t>Searching for data is absolutely fine. But what if the app thinks our data is actually code? How does it tell the difference?</a:t>
             </a:r>
-            <a:endParaRPr/>
+            <a:endParaRPr dirty="0"/>
           </a:p>
           <a:p>
             <a:pPr marL="0" lvl="0" indent="0">
@@ -8242,10 +7839,10 @@
               <a:buNone/>
             </a:pPr>
             <a:r>
-              <a:rPr lang="en"/>
+              <a:rPr lang="en" dirty="0"/>
               <a:t>Answer: it can’t. Not without some consideration.</a:t>
             </a:r>
-            <a:endParaRPr/>
+            <a:endParaRPr dirty="0"/>
           </a:p>
           <a:p>
             <a:pPr marL="0" lvl="0" indent="0">
@@ -8258,10 +7855,10 @@
               <a:buNone/>
             </a:pPr>
             <a:r>
-              <a:rPr lang="en"/>
+              <a:rPr lang="en" dirty="0"/>
               <a:t>The red writing is our SQL injection that always goes to true. This gives us all emails on the Users table.</a:t>
             </a:r>
-            <a:endParaRPr/>
+            <a:endParaRPr dirty="0"/>
           </a:p>
           <a:p>
             <a:pPr marL="0" lvl="0" indent="0" algn="ctr" rtl="0">
@@ -8274,16 +7871,34 @@
               <a:buNone/>
             </a:pPr>
             <a:r>
-              <a:rPr lang="en">
+              <a:rPr lang="en" dirty="0">
                 <a:latin typeface="Courier New"/>
                 <a:ea typeface="Courier New"/>
                 <a:cs typeface="Courier New"/>
                 <a:sym typeface="Courier New"/>
               </a:rPr>
-              <a:t>SELECT `email` FROM `Users` WHERE `uname` = ‘</a:t>
-            </a:r>
-            <a:r>
-              <a:rPr lang="en" b="1">
+              <a:t>SELECT `email` FROM `Users` WHERE `</a:t>
+            </a:r>
+            <a:r>
+              <a:rPr lang="en" dirty="0" err="1">
+                <a:latin typeface="Courier New"/>
+                <a:ea typeface="Courier New"/>
+                <a:cs typeface="Courier New"/>
+                <a:sym typeface="Courier New"/>
+              </a:rPr>
+              <a:t>uname</a:t>
+            </a:r>
+            <a:r>
+              <a:rPr lang="en" dirty="0">
+                <a:latin typeface="Courier New"/>
+                <a:ea typeface="Courier New"/>
+                <a:cs typeface="Courier New"/>
+                <a:sym typeface="Courier New"/>
+              </a:rPr>
+              <a:t>` = ‘</a:t>
+            </a:r>
+            <a:r>
+              <a:rPr lang="en" b="1" dirty="0">
                 <a:solidFill>
                   <a:srgbClr val="FF0000"/>
                 </a:solidFill>
@@ -8295,7 +7910,7 @@
               <a:t>’ or ‘1’=’1</a:t>
             </a:r>
             <a:r>
-              <a:rPr lang="en">
+              <a:rPr lang="en" dirty="0">
                 <a:latin typeface="Courier New"/>
                 <a:ea typeface="Courier New"/>
                 <a:cs typeface="Courier New"/>
@@ -8303,7 +7918,7 @@
               </a:rPr>
               <a:t>’;</a:t>
             </a:r>
-            <a:endParaRPr/>
+            <a:endParaRPr dirty="0"/>
           </a:p>
         </p:txBody>
       </p:sp>
@@ -8315,12 +7930,12 @@
 </p:sld>
 </file>
 
-<file path=ppt/slides/slide12.xml><?xml version="1.0" encoding="utf-8"?>
+<file path=ppt/slides/slide11.xml><?xml version="1.0" encoding="utf-8"?>
 <p:sld xmlns:a="http://schemas.openxmlformats.org/drawingml/2006/main" xmlns:r="http://schemas.openxmlformats.org/officeDocument/2006/relationships" xmlns:p="http://schemas.openxmlformats.org/presentationml/2006/main">
   <p:cSld>
     <p:spTree>
       <p:nvGrpSpPr>
-        <p:cNvPr id="1" name="Shape 121"/>
+        <p:cNvPr id="1" name=""/>
         <p:cNvGrpSpPr/>
         <p:nvPr/>
       </p:nvGrpSpPr>
@@ -8334,115 +7949,190 @@
       </p:grpSpPr>
       <p:sp>
         <p:nvSpPr>
-          <p:cNvPr id="122" name="Shape 122"/>
-          <p:cNvSpPr txBox="1">
+          <p:cNvPr id="2" name="Title 1"/>
+          <p:cNvSpPr>
             <a:spLocks noGrp="1"/>
           </p:cNvSpPr>
           <p:nvPr>
             <p:ph type="title"/>
           </p:nvPr>
         </p:nvSpPr>
-        <p:spPr>
-          <a:xfrm>
-            <a:off x="471900" y="738725"/>
-            <a:ext cx="8222100" cy="767700"/>
-          </a:xfrm>
-          <a:prstGeom prst="rect">
-            <a:avLst/>
-          </a:prstGeom>
-        </p:spPr>
+        <p:spPr/>
         <p:txBody>
-          <a:bodyPr spcFirstLastPara="1" wrap="square" lIns="91425" tIns="91425" rIns="91425" bIns="91425" anchor="b" anchorCtr="0">
-            <a:noAutofit/>
-          </a:bodyPr>
+          <a:bodyPr/>
           <a:lstStyle/>
           <a:p>
-            <a:pPr marL="0" lvl="0" indent="0">
-              <a:spcBef>
-                <a:spcPts val="0"/>
-              </a:spcBef>
-              <a:spcAft>
-                <a:spcPts val="0"/>
-              </a:spcAft>
-              <a:buNone/>
-            </a:pPr>
-            <a:r>
-              <a:rPr lang="en"/>
-              <a:t>Onto the exercises</a:t>
-            </a:r>
-            <a:endParaRPr/>
+            <a:r>
+              <a:rPr lang="en-US" dirty="0" smtClean="0"/>
+              <a:t>SQL Injections </a:t>
+            </a:r>
+            <a:endParaRPr lang="en-US" dirty="0"/>
           </a:p>
         </p:txBody>
       </p:sp>
       <p:sp>
         <p:nvSpPr>
-          <p:cNvPr id="123" name="Shape 123"/>
-          <p:cNvSpPr txBox="1">
+          <p:cNvPr id="3" name="Text Placeholder 2"/>
+          <p:cNvSpPr>
             <a:spLocks noGrp="1"/>
           </p:cNvSpPr>
           <p:nvPr>
             <p:ph type="body" idx="1"/>
           </p:nvPr>
         </p:nvSpPr>
+        <p:spPr/>
+        <p:txBody>
+          <a:bodyPr/>
+          <a:lstStyle/>
+          <a:p>
+            <a:r>
+              <a:rPr lang="en-US" dirty="0" smtClean="0"/>
+              <a:t>Let’s presume the cyber security team at Google is completely incompetent and do not sanitize their user inputs. </a:t>
+            </a:r>
+          </a:p>
+          <a:p>
+            <a:r>
+              <a:rPr lang="en-US" dirty="0"/>
+              <a:t>O</a:t>
+            </a:r>
+            <a:r>
+              <a:rPr lang="en-US" dirty="0" smtClean="0"/>
+              <a:t>nly allowing </a:t>
+            </a:r>
+            <a:r>
+              <a:rPr lang="en-US" dirty="0"/>
+              <a:t>the user to </a:t>
+            </a:r>
+            <a:r>
+              <a:rPr lang="en-US" b="1" dirty="0"/>
+              <a:t>input</a:t>
+            </a:r>
+            <a:r>
+              <a:rPr lang="en-US" dirty="0"/>
+              <a:t> data of your expected type. If it's not the proper type, discard it. </a:t>
+            </a:r>
+            <a:r>
+              <a:rPr lang="en-US" dirty="0" smtClean="0"/>
+              <a:t> </a:t>
+            </a:r>
+          </a:p>
+        </p:txBody>
+      </p:sp>
+    </p:spTree>
+    <p:extLst>
+      <p:ext uri="{BB962C8B-B14F-4D97-AF65-F5344CB8AC3E}">
+        <p14:creationId xmlns:p14="http://schemas.microsoft.com/office/powerpoint/2010/main" val="549340854"/>
+      </p:ext>
+    </p:extLst>
+  </p:cSld>
+  <p:clrMapOvr>
+    <a:masterClrMapping/>
+  </p:clrMapOvr>
+</p:sld>
+</file>
+
+<file path=ppt/slides/slide12.xml><?xml version="1.0" encoding="utf-8"?>
+<p:sld xmlns:a="http://schemas.openxmlformats.org/drawingml/2006/main" xmlns:r="http://schemas.openxmlformats.org/officeDocument/2006/relationships" xmlns:p="http://schemas.openxmlformats.org/presentationml/2006/main">
+  <p:cSld>
+    <p:spTree>
+      <p:nvGrpSpPr>
+        <p:cNvPr id="1" name=""/>
+        <p:cNvGrpSpPr/>
+        <p:nvPr/>
+      </p:nvGrpSpPr>
+      <p:grpSpPr>
+        <a:xfrm>
+          <a:off x="0" y="0"/>
+          <a:ext cx="0" cy="0"/>
+          <a:chOff x="0" y="0"/>
+          <a:chExt cx="0" cy="0"/>
+        </a:xfrm>
+      </p:grpSpPr>
+      <p:sp>
+        <p:nvSpPr>
+          <p:cNvPr id="2" name="Title 1"/>
+          <p:cNvSpPr>
+            <a:spLocks noGrp="1"/>
+          </p:cNvSpPr>
+          <p:nvPr>
+            <p:ph type="title"/>
+          </p:nvPr>
+        </p:nvSpPr>
+        <p:spPr/>
+        <p:txBody>
+          <a:bodyPr/>
+          <a:lstStyle/>
+          <a:p>
+            <a:r>
+              <a:rPr lang="en-US" dirty="0" smtClean="0"/>
+              <a:t> </a:t>
+            </a:r>
+            <a:endParaRPr lang="en-US" dirty="0"/>
+          </a:p>
+        </p:txBody>
+      </p:sp>
+      <p:sp>
+        <p:nvSpPr>
+          <p:cNvPr id="3" name="Text Placeholder 2"/>
+          <p:cNvSpPr>
+            <a:spLocks noGrp="1"/>
+          </p:cNvSpPr>
+          <p:nvPr>
+            <p:ph type="body" idx="1"/>
+          </p:nvPr>
+        </p:nvSpPr>
+        <p:spPr/>
+        <p:txBody>
+          <a:bodyPr/>
+          <a:lstStyle/>
+          <a:p>
+            <a:pPr marL="114300" indent="0">
+              <a:buNone/>
+            </a:pPr>
+            <a:r>
+              <a:rPr lang="en-US" dirty="0" smtClean="0"/>
+              <a:t> </a:t>
+            </a:r>
+            <a:endParaRPr lang="en-US" dirty="0"/>
+          </a:p>
+        </p:txBody>
+      </p:sp>
+      <p:pic>
+        <p:nvPicPr>
+          <p:cNvPr id="4" name="Picture 3"/>
+          <p:cNvPicPr>
+            <a:picLocks noChangeAspect="1"/>
+          </p:cNvPicPr>
+          <p:nvPr/>
+        </p:nvPicPr>
+        <p:blipFill>
+          <a:blip r:embed="rId2">
+            <a:extLst>
+              <a:ext uri="{28A0092B-C50C-407E-A947-70E740481C1C}">
+                <a14:useLocalDpi xmlns:a14="http://schemas.microsoft.com/office/drawing/2010/main" val="0"/>
+              </a:ext>
+            </a:extLst>
+          </a:blip>
+          <a:stretch>
+            <a:fillRect/>
+          </a:stretch>
+        </p:blipFill>
         <p:spPr>
           <a:xfrm>
-            <a:off x="471900" y="1818600"/>
-            <a:ext cx="8222100" cy="2710200"/>
+            <a:off x="1640264" y="0"/>
+            <a:ext cx="5627689" cy="5143500"/>
           </a:xfrm>
           <a:prstGeom prst="rect">
             <a:avLst/>
           </a:prstGeom>
         </p:spPr>
-        <p:txBody>
-          <a:bodyPr spcFirstLastPara="1" wrap="square" lIns="91425" tIns="91425" rIns="91425" bIns="91425" anchor="t" anchorCtr="0">
-            <a:noAutofit/>
-          </a:bodyPr>
-          <a:lstStyle/>
-          <a:p>
-            <a:pPr marL="457200" lvl="0" indent="-342900" rtl="0">
-              <a:spcBef>
-                <a:spcPts val="0"/>
-              </a:spcBef>
-              <a:spcAft>
-                <a:spcPts val="0"/>
-              </a:spcAft>
-              <a:buSzPts val="1800"/>
-              <a:buChar char="-"/>
-            </a:pPr>
-            <a:r>
-              <a:rPr lang="en" dirty="0"/>
-              <a:t>You’re going to be asked to be quite creative for the rest of these questions. I will go over them if people get stuck.</a:t>
-            </a:r>
-            <a:endParaRPr dirty="0"/>
-          </a:p>
-          <a:p>
-            <a:pPr marL="457200" lvl="0" indent="-342900" rtl="0">
-              <a:spcBef>
-                <a:spcPts val="0"/>
-              </a:spcBef>
-              <a:spcAft>
-                <a:spcPts val="0"/>
-              </a:spcAft>
-              <a:buSzPts val="1800"/>
-              <a:buChar char="-"/>
-            </a:pPr>
-            <a:r>
-              <a:rPr lang="en" dirty="0"/>
-              <a:t>Feel free to roam around </a:t>
-            </a:r>
-            <a:r>
-              <a:rPr lang="en-US" dirty="0" err="1" smtClean="0"/>
-              <a:t>overthewire</a:t>
-            </a:r>
-            <a:r>
-              <a:rPr lang="en" dirty="0" smtClean="0"/>
-              <a:t>.</a:t>
-            </a:r>
-            <a:endParaRPr dirty="0"/>
-          </a:p>
-        </p:txBody>
-      </p:sp>
+      </p:pic>
     </p:spTree>
+    <p:extLst>
+      <p:ext uri="{BB962C8B-B14F-4D97-AF65-F5344CB8AC3E}">
+        <p14:creationId xmlns:p14="http://schemas.microsoft.com/office/powerpoint/2010/main" val="1184334171"/>
+      </p:ext>
+    </p:extLst>
   </p:cSld>
   <p:clrMapOvr>
     <a:masterClrMapping/>
@@ -8451,6 +8141,267 @@
 </file>
 
 <file path=ppt/slides/slide13.xml><?xml version="1.0" encoding="utf-8"?>
+<p:sld xmlns:a="http://schemas.openxmlformats.org/drawingml/2006/main" xmlns:r="http://schemas.openxmlformats.org/officeDocument/2006/relationships" xmlns:p="http://schemas.openxmlformats.org/presentationml/2006/main">
+  <p:cSld>
+    <p:spTree>
+      <p:nvGrpSpPr>
+        <p:cNvPr id="1" name=""/>
+        <p:cNvGrpSpPr/>
+        <p:nvPr/>
+      </p:nvGrpSpPr>
+      <p:grpSpPr>
+        <a:xfrm>
+          <a:off x="0" y="0"/>
+          <a:ext cx="0" cy="0"/>
+          <a:chOff x="0" y="0"/>
+          <a:chExt cx="0" cy="0"/>
+        </a:xfrm>
+      </p:grpSpPr>
+      <p:sp>
+        <p:nvSpPr>
+          <p:cNvPr id="2" name="Title 1"/>
+          <p:cNvSpPr>
+            <a:spLocks noGrp="1"/>
+          </p:cNvSpPr>
+          <p:nvPr>
+            <p:ph type="title"/>
+          </p:nvPr>
+        </p:nvSpPr>
+        <p:spPr/>
+        <p:txBody>
+          <a:bodyPr/>
+          <a:lstStyle/>
+          <a:p>
+            <a:r>
+              <a:rPr lang="en-US" dirty="0" smtClean="0"/>
+              <a:t>SQL Injections</a:t>
+            </a:r>
+            <a:endParaRPr lang="en-US" dirty="0"/>
+          </a:p>
+        </p:txBody>
+      </p:sp>
+      <p:sp>
+        <p:nvSpPr>
+          <p:cNvPr id="3" name="Text Placeholder 2"/>
+          <p:cNvSpPr>
+            <a:spLocks noGrp="1"/>
+          </p:cNvSpPr>
+          <p:nvPr>
+            <p:ph type="body" idx="1"/>
+          </p:nvPr>
+        </p:nvSpPr>
+        <p:spPr/>
+        <p:txBody>
+          <a:bodyPr/>
+          <a:lstStyle/>
+          <a:p>
+            <a:r>
+              <a:rPr lang="en-US" dirty="0" smtClean="0"/>
+              <a:t>So how can you trick the login?</a:t>
+            </a:r>
+          </a:p>
+          <a:p>
+            <a:r>
+              <a:rPr lang="en-US" dirty="0" smtClean="0"/>
+              <a:t>Entering </a:t>
+            </a:r>
+            <a:r>
+              <a:rPr lang="mr-IN" dirty="0" smtClean="0"/>
+              <a:t>' </a:t>
+            </a:r>
+            <a:r>
+              <a:rPr lang="mr-IN" dirty="0"/>
+              <a:t>OR '1'=</a:t>
+            </a:r>
+            <a:r>
+              <a:rPr lang="mr-IN" dirty="0" smtClean="0"/>
+              <a:t>'1</a:t>
+            </a:r>
+            <a:r>
+              <a:rPr lang="en-US" dirty="0" smtClean="0"/>
+              <a:t> would give you access if user input is not sanitized</a:t>
+            </a:r>
+          </a:p>
+          <a:p>
+            <a:r>
+              <a:rPr lang="en-US" dirty="0" smtClean="0"/>
+              <a:t>But why?</a:t>
+            </a:r>
+            <a:endParaRPr lang="en-US" dirty="0"/>
+          </a:p>
+        </p:txBody>
+      </p:sp>
+    </p:spTree>
+    <p:extLst>
+      <p:ext uri="{BB962C8B-B14F-4D97-AF65-F5344CB8AC3E}">
+        <p14:creationId xmlns:p14="http://schemas.microsoft.com/office/powerpoint/2010/main" val="1843052664"/>
+      </p:ext>
+    </p:extLst>
+  </p:cSld>
+  <p:clrMapOvr>
+    <a:masterClrMapping/>
+  </p:clrMapOvr>
+</p:sld>
+</file>
+
+<file path=ppt/slides/slide14.xml><?xml version="1.0" encoding="utf-8"?>
+<p:sld xmlns:a="http://schemas.openxmlformats.org/drawingml/2006/main" xmlns:r="http://schemas.openxmlformats.org/officeDocument/2006/relationships" xmlns:p="http://schemas.openxmlformats.org/presentationml/2006/main">
+  <p:cSld>
+    <p:spTree>
+      <p:nvGrpSpPr>
+        <p:cNvPr id="1" name=""/>
+        <p:cNvGrpSpPr/>
+        <p:nvPr/>
+      </p:nvGrpSpPr>
+      <p:grpSpPr>
+        <a:xfrm>
+          <a:off x="0" y="0"/>
+          <a:ext cx="0" cy="0"/>
+          <a:chOff x="0" y="0"/>
+          <a:chExt cx="0" cy="0"/>
+        </a:xfrm>
+      </p:grpSpPr>
+      <p:sp>
+        <p:nvSpPr>
+          <p:cNvPr id="2" name="Title 1"/>
+          <p:cNvSpPr>
+            <a:spLocks noGrp="1"/>
+          </p:cNvSpPr>
+          <p:nvPr>
+            <p:ph type="title"/>
+          </p:nvPr>
+        </p:nvSpPr>
+        <p:spPr/>
+        <p:txBody>
+          <a:bodyPr/>
+          <a:lstStyle/>
+          <a:p>
+            <a:r>
+              <a:rPr lang="en-US" dirty="0" smtClean="0"/>
+              <a:t>SQL Injections</a:t>
+            </a:r>
+            <a:endParaRPr lang="en-US" dirty="0"/>
+          </a:p>
+        </p:txBody>
+      </p:sp>
+      <p:sp>
+        <p:nvSpPr>
+          <p:cNvPr id="3" name="Text Placeholder 2"/>
+          <p:cNvSpPr>
+            <a:spLocks noGrp="1"/>
+          </p:cNvSpPr>
+          <p:nvPr>
+            <p:ph type="body" idx="1"/>
+          </p:nvPr>
+        </p:nvSpPr>
+        <p:spPr/>
+        <p:txBody>
+          <a:bodyPr/>
+          <a:lstStyle/>
+          <a:p>
+            <a:pPr lvl="0"/>
+            <a:r>
+              <a:rPr lang="en" dirty="0">
+                <a:latin typeface="Courier New"/>
+                <a:ea typeface="Courier New"/>
+                <a:cs typeface="Courier New"/>
+                <a:sym typeface="Courier New"/>
+              </a:rPr>
+              <a:t>SELECT `email` FROM `Users` WHERE `</a:t>
+            </a:r>
+            <a:r>
+              <a:rPr lang="en" dirty="0" err="1">
+                <a:latin typeface="Courier New"/>
+                <a:ea typeface="Courier New"/>
+                <a:cs typeface="Courier New"/>
+                <a:sym typeface="Courier New"/>
+              </a:rPr>
+              <a:t>uname</a:t>
+            </a:r>
+            <a:r>
+              <a:rPr lang="en" dirty="0">
+                <a:latin typeface="Courier New"/>
+                <a:ea typeface="Courier New"/>
+                <a:cs typeface="Courier New"/>
+                <a:sym typeface="Courier New"/>
+              </a:rPr>
+              <a:t>` = ‘</a:t>
+            </a:r>
+            <a:r>
+              <a:rPr lang="en" b="1" dirty="0">
+                <a:solidFill>
+                  <a:srgbClr val="FF0000"/>
+                </a:solidFill>
+                <a:latin typeface="Courier New"/>
+                <a:ea typeface="Courier New"/>
+                <a:cs typeface="Courier New"/>
+                <a:sym typeface="Courier New"/>
+              </a:rPr>
+              <a:t>’ or ‘1’=’1</a:t>
+            </a:r>
+            <a:r>
+              <a:rPr lang="en" dirty="0" smtClean="0">
+                <a:latin typeface="Courier New"/>
+                <a:ea typeface="Courier New"/>
+                <a:cs typeface="Courier New"/>
+                <a:sym typeface="Courier New"/>
+              </a:rPr>
+              <a:t>’;</a:t>
+            </a:r>
+            <a:endParaRPr lang="en-US" dirty="0" smtClean="0">
+              <a:latin typeface="Courier New"/>
+              <a:ea typeface="Courier New"/>
+              <a:cs typeface="Courier New"/>
+              <a:sym typeface="Courier New"/>
+            </a:endParaRPr>
+          </a:p>
+          <a:p>
+            <a:pPr lvl="0"/>
+            <a:r>
+              <a:rPr lang="en-US" dirty="0" smtClean="0">
+                <a:latin typeface="Courier New"/>
+                <a:ea typeface="Courier New"/>
+                <a:cs typeface="Courier New"/>
+                <a:sym typeface="Courier New"/>
+              </a:rPr>
+              <a:t>The end quote escapes the query </a:t>
+            </a:r>
+          </a:p>
+          <a:p>
+            <a:pPr lvl="0"/>
+            <a:r>
+              <a:rPr lang="en-US" dirty="0" smtClean="0">
+                <a:latin typeface="Courier New"/>
+                <a:ea typeface="Courier New"/>
+                <a:cs typeface="Courier New"/>
+                <a:sym typeface="Courier New"/>
+              </a:rPr>
+              <a:t>What are other ways to escape queries? (Will be useful for worksheet)</a:t>
+            </a:r>
+            <a:endParaRPr lang="en" dirty="0"/>
+          </a:p>
+          <a:p>
+            <a:pPr marL="114300" indent="0">
+              <a:buNone/>
+            </a:pPr>
+            <a:endParaRPr lang="en-US" dirty="0"/>
+          </a:p>
+        </p:txBody>
+      </p:sp>
+    </p:spTree>
+    <p:extLst>
+      <p:ext uri="{BB962C8B-B14F-4D97-AF65-F5344CB8AC3E}">
+        <p14:creationId xmlns:p14="http://schemas.microsoft.com/office/powerpoint/2010/main" val="1772770928"/>
+      </p:ext>
+    </p:extLst>
+  </p:cSld>
+  <p:clrMapOvr>
+    <a:masterClrMapping/>
+  </p:clrMapOvr>
+</p:sld>
+</file>
+
+<file path=ppt/slides/slide15.xml><?xml version="1.0" encoding="utf-8"?>
 <p:sld xmlns:a="http://schemas.openxmlformats.org/drawingml/2006/main" xmlns:r="http://schemas.openxmlformats.org/officeDocument/2006/relationships" xmlns:p="http://schemas.openxmlformats.org/presentationml/2006/main">
   <p:cSld>
     <p:spTree>
@@ -8545,10 +8496,10 @@
               <a:buChar char="-"/>
             </a:pPr>
             <a:r>
-              <a:rPr lang="en"/>
+              <a:rPr lang="en" dirty="0"/>
               <a:t>Take backups. This is trivially easy for most DBMSs and should be done anyway.</a:t>
             </a:r>
-            <a:endParaRPr/>
+            <a:endParaRPr dirty="0"/>
           </a:p>
           <a:p>
             <a:pPr marL="457200" lvl="0" indent="-342900" rtl="0">
@@ -8562,10 +8513,10 @@
               <a:buChar char="-"/>
             </a:pPr>
             <a:r>
-              <a:rPr lang="en"/>
+              <a:rPr lang="en" dirty="0"/>
               <a:t>Find necessary permissions for each user and only give those permissions.</a:t>
             </a:r>
-            <a:endParaRPr/>
+            <a:endParaRPr dirty="0"/>
           </a:p>
           <a:p>
             <a:pPr marL="457200" lvl="0" indent="-342900" rtl="0">
@@ -8579,13 +8530,25 @@
               <a:buChar char="-"/>
             </a:pPr>
             <a:r>
-              <a:rPr lang="en"/>
-              <a:t>Parameterise (prepared statements) and sanitise your inputs. Or easier:</a:t>
-            </a:r>
-            <a:endParaRPr/>
-          </a:p>
-          <a:p>
-            <a:pPr marL="457200" lvl="0" indent="-342900">
+              <a:rPr lang="en" dirty="0" err="1"/>
+              <a:t>Parameterise</a:t>
+            </a:r>
+            <a:r>
+              <a:rPr lang="en" dirty="0"/>
+              <a:t> (prepared statements) and </a:t>
+            </a:r>
+            <a:r>
+              <a:rPr lang="en" dirty="0" err="1"/>
+              <a:t>sanitise</a:t>
+            </a:r>
+            <a:r>
+              <a:rPr lang="en" dirty="0"/>
+              <a:t> your inputs. </a:t>
+            </a:r>
+            <a:endParaRPr lang="en-US" dirty="0" smtClean="0"/>
+          </a:p>
+          <a:p>
+            <a:pPr marL="457200" lvl="0" indent="-342900" rtl="0">
               <a:spcBef>
                 <a:spcPts val="0"/>
               </a:spcBef>
@@ -8596,10 +8559,22 @@
               <a:buChar char="-"/>
             </a:pPr>
             <a:r>
-              <a:rPr lang="en"/>
-              <a:t>Use a framework that does it for you.</a:t>
-            </a:r>
-            <a:endParaRPr/>
+              <a:rPr lang="en-US" dirty="0" smtClean="0"/>
+              <a:t>Or even easier</a:t>
+            </a:r>
+            <a:r>
+              <a:rPr lang="en-US" smtClean="0"/>
+              <a:t>, u</a:t>
+            </a:r>
+            <a:r>
+              <a:rPr lang="en" smtClean="0"/>
+              <a:t>se </a:t>
+            </a:r>
+            <a:r>
+              <a:rPr lang="en" dirty="0"/>
+              <a:t>a framework that does it for you.</a:t>
+            </a:r>
+            <a:endParaRPr dirty="0"/>
           </a:p>
         </p:txBody>
       </p:sp>
@@ -8611,7 +8586,7 @@
 </p:sld>
 </file>
 
-<file path=ppt/slides/slide14.xml><?xml version="1.0" encoding="utf-8"?>
+<file path=ppt/slides/slide16.xml><?xml version="1.0" encoding="utf-8"?>
 <p:sld xmlns:a="http://schemas.openxmlformats.org/drawingml/2006/main" xmlns:r="http://schemas.openxmlformats.org/officeDocument/2006/relationships" xmlns:p="http://schemas.openxmlformats.org/presentationml/2006/main">
   <p:cSld>
     <p:spTree>
@@ -8701,6 +8676,176 @@
     <p:extLst>
       <p:ext uri="{BB962C8B-B14F-4D97-AF65-F5344CB8AC3E}">
         <p14:creationId xmlns:p14="http://schemas.microsoft.com/office/powerpoint/2010/main" val="1738834928"/>
+      </p:ext>
+    </p:extLst>
+  </p:cSld>
+  <p:clrMapOvr>
+    <a:masterClrMapping/>
+  </p:clrMapOvr>
+</p:sld>
+</file>
+
+<file path=ppt/slides/slide17.xml><?xml version="1.0" encoding="utf-8"?>
+<p:sld xmlns:a="http://schemas.openxmlformats.org/drawingml/2006/main" xmlns:r="http://schemas.openxmlformats.org/officeDocument/2006/relationships" xmlns:p="http://schemas.openxmlformats.org/presentationml/2006/main">
+  <p:cSld>
+    <p:spTree>
+      <p:nvGrpSpPr>
+        <p:cNvPr id="1" name=""/>
+        <p:cNvGrpSpPr/>
+        <p:nvPr/>
+      </p:nvGrpSpPr>
+      <p:grpSpPr>
+        <a:xfrm>
+          <a:off x="0" y="0"/>
+          <a:ext cx="0" cy="0"/>
+          <a:chOff x="0" y="0"/>
+          <a:chExt cx="0" cy="0"/>
+        </a:xfrm>
+      </p:grpSpPr>
+      <p:sp>
+        <p:nvSpPr>
+          <p:cNvPr id="2" name="Title 1"/>
+          <p:cNvSpPr>
+            <a:spLocks noGrp="1"/>
+          </p:cNvSpPr>
+          <p:nvPr>
+            <p:ph type="title"/>
+          </p:nvPr>
+        </p:nvSpPr>
+        <p:spPr/>
+        <p:txBody>
+          <a:bodyPr/>
+          <a:lstStyle/>
+          <a:p>
+            <a:r>
+              <a:rPr lang="en-US" dirty="0" smtClean="0"/>
+              <a:t>On to the worksheet</a:t>
+            </a:r>
+            <a:endParaRPr lang="en-US" dirty="0"/>
+          </a:p>
+        </p:txBody>
+      </p:sp>
+      <p:sp>
+        <p:nvSpPr>
+          <p:cNvPr id="3" name="Text Placeholder 2"/>
+          <p:cNvSpPr>
+            <a:spLocks noGrp="1"/>
+          </p:cNvSpPr>
+          <p:nvPr>
+            <p:ph type="body" idx="1"/>
+          </p:nvPr>
+        </p:nvSpPr>
+        <p:spPr/>
+        <p:txBody>
+          <a:bodyPr/>
+          <a:lstStyle/>
+          <a:p>
+            <a:r>
+              <a:rPr lang="en-US" dirty="0" err="1"/>
+              <a:t>g</a:t>
+            </a:r>
+            <a:r>
+              <a:rPr lang="en-US" dirty="0" err="1" smtClean="0"/>
+              <a:t>it</a:t>
+            </a:r>
+            <a:r>
+              <a:rPr lang="en-US" dirty="0" smtClean="0"/>
+              <a:t> </a:t>
+            </a:r>
+            <a:r>
+              <a:rPr lang="en-US" dirty="0"/>
+              <a:t>clone </a:t>
+            </a:r>
+            <a:r>
+              <a:rPr lang="en-US" dirty="0">
+                <a:hlinkClick r:id="rId2"/>
+              </a:rPr>
+              <a:t>https://</a:t>
+            </a:r>
+            <a:r>
+              <a:rPr lang="en-US" dirty="0" smtClean="0">
+                <a:hlinkClick r:id="rId2"/>
+              </a:rPr>
+              <a:t>github.com/umisc/workshops.git</a:t>
+            </a:r>
+            <a:endParaRPr lang="en-US" dirty="0" smtClean="0"/>
+          </a:p>
+          <a:p>
+            <a:r>
+              <a:rPr lang="en-US" dirty="0"/>
+              <a:t>Or else go to </a:t>
+            </a:r>
+            <a:r>
+              <a:rPr lang="en-US" dirty="0">
+                <a:hlinkClick r:id="rId3"/>
+              </a:rPr>
+              <a:t>https://</a:t>
+            </a:r>
+            <a:r>
+              <a:rPr lang="en-US" dirty="0" smtClean="0">
+                <a:hlinkClick r:id="rId3"/>
+              </a:rPr>
+              <a:t>github.com/umisc/workshops</a:t>
+            </a:r>
+            <a:r>
+              <a:rPr lang="en-US" dirty="0" smtClean="0"/>
+              <a:t> and download the repository</a:t>
+            </a:r>
+          </a:p>
+          <a:p>
+            <a:r>
+              <a:rPr lang="en-US" dirty="0" smtClean="0"/>
+              <a:t>We will be using workshop_2 for today</a:t>
+            </a:r>
+          </a:p>
+          <a:p>
+            <a:r>
+              <a:rPr lang="en-US" dirty="0" smtClean="0"/>
+              <a:t>We will </a:t>
+            </a:r>
+            <a:r>
+              <a:rPr lang="en-US" dirty="0"/>
+              <a:t>go over them if people get </a:t>
+            </a:r>
+            <a:r>
+              <a:rPr lang="en-US" dirty="0" smtClean="0"/>
+              <a:t>stuck.</a:t>
+            </a:r>
+          </a:p>
+          <a:p>
+            <a:r>
+              <a:rPr lang="en-US" dirty="0" smtClean="0"/>
+              <a:t>Feel </a:t>
+            </a:r>
+            <a:r>
+              <a:rPr lang="en-US" dirty="0"/>
+              <a:t>free to roam around </a:t>
+            </a:r>
+            <a:r>
+              <a:rPr lang="en-US" dirty="0" err="1"/>
+              <a:t>overthewire</a:t>
+            </a:r>
+            <a:r>
+              <a:rPr lang="en-US" dirty="0" smtClean="0"/>
+              <a:t>. </a:t>
+            </a:r>
+            <a:endParaRPr lang="en-US" dirty="0"/>
+          </a:p>
+          <a:p>
+            <a:endParaRPr lang="en-US" dirty="0" smtClean="0"/>
+          </a:p>
+          <a:p>
+            <a:pPr marL="114300" indent="0">
+              <a:buNone/>
+            </a:pPr>
+            <a:endParaRPr lang="en-US" dirty="0"/>
+          </a:p>
+        </p:txBody>
+      </p:sp>
+    </p:spTree>
+    <p:extLst>
+      <p:ext uri="{BB962C8B-B14F-4D97-AF65-F5344CB8AC3E}">
+        <p14:creationId xmlns:p14="http://schemas.microsoft.com/office/powerpoint/2010/main" val="1364382148"/>
       </p:ext>
     </p:extLst>
   </p:cSld>
@@ -8972,15 +9117,7 @@
           <a:p>
             <a:r>
               <a:rPr lang="en-US" dirty="0" smtClean="0"/>
-              <a:t>You DO NOT REQUIRE Kali </a:t>
-            </a:r>
-            <a:r>
-              <a:rPr lang="en-US" dirty="0" err="1" smtClean="0"/>
-              <a:t>linux</a:t>
-            </a:r>
-            <a:r>
-              <a:rPr lang="en-US" dirty="0" smtClean="0"/>
-              <a:t> for today’s workshop</a:t>
+              <a:t>You DO NOT REQUIRE Kali Linux for today’s workshop</a:t>
             </a:r>
           </a:p>
           <a:p>

</xml_diff>